<commit_message>
actualiza imágenes en ppt
</commit_message>
<xml_diff>
--- a/jupyter-summary/imagenes.pptx
+++ b/jupyter-summary/imagenes.pptx
@@ -4039,6 +4039,50 @@
           </a:prstGeom>
         </p:spPr>
       </p:pic>
+      <p:sp>
+        <p:nvSpPr>
+          <p:cNvPr id="18" name="Flecha: hacia abajo 17">
+            <a:extLst>
+              <a:ext uri="{FF2B5EF4-FFF2-40B4-BE49-F238E27FC236}">
+                <a16:creationId xmlns:a16="http://schemas.microsoft.com/office/drawing/2014/main" id="{B1123A02-E4CC-466F-8F84-5F7614040076}"/>
+              </a:ext>
+            </a:extLst>
+          </p:cNvPr>
+          <p:cNvSpPr/>
+          <p:nvPr/>
+        </p:nvSpPr>
+        <p:spPr>
+          <a:xfrm rot="5032494">
+            <a:off x="8979127" y="3363413"/>
+            <a:ext cx="398918" cy="2792041"/>
+          </a:xfrm>
+          <a:prstGeom prst="downArrow">
+            <a:avLst/>
+          </a:prstGeom>
+        </p:spPr>
+        <p:style>
+          <a:lnRef idx="1">
+            <a:schemeClr val="accent6"/>
+          </a:lnRef>
+          <a:fillRef idx="2">
+            <a:schemeClr val="accent6"/>
+          </a:fillRef>
+          <a:effectRef idx="1">
+            <a:schemeClr val="accent6"/>
+          </a:effectRef>
+          <a:fontRef idx="minor">
+            <a:schemeClr val="dk1"/>
+          </a:fontRef>
+        </p:style>
+        <p:txBody>
+          <a:bodyPr vert="vert270" rtlCol="0" anchor="ctr"/>
+          <a:lstStyle/>
+          <a:p>
+            <a:pPr algn="ctr"/>
+            <a:endParaRPr lang="es-CO" dirty="0"/>
+          </a:p>
+        </p:txBody>
+      </p:sp>
     </p:spTree>
     <p:extLst>
       <p:ext uri="{BB962C8B-B14F-4D97-AF65-F5344CB8AC3E}">
@@ -4797,6 +4841,50 @@
           </a:p>
         </p:txBody>
       </p:sp>
+      <p:sp>
+        <p:nvSpPr>
+          <p:cNvPr id="20" name="Flecha: hacia abajo 19">
+            <a:extLst>
+              <a:ext uri="{FF2B5EF4-FFF2-40B4-BE49-F238E27FC236}">
+                <a16:creationId xmlns:a16="http://schemas.microsoft.com/office/drawing/2014/main" id="{B1DAE6EE-82D4-49AA-B008-F3C0E8A665A0}"/>
+              </a:ext>
+            </a:extLst>
+          </p:cNvPr>
+          <p:cNvSpPr/>
+          <p:nvPr/>
+        </p:nvSpPr>
+        <p:spPr>
+          <a:xfrm rot="5032494">
+            <a:off x="8979127" y="3363413"/>
+            <a:ext cx="398918" cy="2792041"/>
+          </a:xfrm>
+          <a:prstGeom prst="downArrow">
+            <a:avLst/>
+          </a:prstGeom>
+        </p:spPr>
+        <p:style>
+          <a:lnRef idx="1">
+            <a:schemeClr val="accent6"/>
+          </a:lnRef>
+          <a:fillRef idx="2">
+            <a:schemeClr val="accent6"/>
+          </a:fillRef>
+          <a:effectRef idx="1">
+            <a:schemeClr val="accent6"/>
+          </a:effectRef>
+          <a:fontRef idx="minor">
+            <a:schemeClr val="dk1"/>
+          </a:fontRef>
+        </p:style>
+        <p:txBody>
+          <a:bodyPr vert="vert270" rtlCol="0" anchor="ctr"/>
+          <a:lstStyle/>
+          <a:p>
+            <a:pPr algn="ctr"/>
+            <a:endParaRPr lang="es-CO" dirty="0"/>
+          </a:p>
+        </p:txBody>
+      </p:sp>
     </p:spTree>
     <p:extLst>
       <p:ext uri="{BB962C8B-B14F-4D97-AF65-F5344CB8AC3E}">
@@ -5768,6 +5856,50 @@
           </a:p>
         </p:txBody>
       </p:sp>
+      <p:sp>
+        <p:nvSpPr>
+          <p:cNvPr id="26" name="Flecha: hacia abajo 25">
+            <a:extLst>
+              <a:ext uri="{FF2B5EF4-FFF2-40B4-BE49-F238E27FC236}">
+                <a16:creationId xmlns:a16="http://schemas.microsoft.com/office/drawing/2014/main" id="{9A11683F-95F3-4CFB-BDDC-BDF0BB3F3EC5}"/>
+              </a:ext>
+            </a:extLst>
+          </p:cNvPr>
+          <p:cNvSpPr/>
+          <p:nvPr/>
+        </p:nvSpPr>
+        <p:spPr>
+          <a:xfrm rot="5032494">
+            <a:off x="8979127" y="3363413"/>
+            <a:ext cx="398918" cy="2792041"/>
+          </a:xfrm>
+          <a:prstGeom prst="downArrow">
+            <a:avLst/>
+          </a:prstGeom>
+        </p:spPr>
+        <p:style>
+          <a:lnRef idx="1">
+            <a:schemeClr val="accent6"/>
+          </a:lnRef>
+          <a:fillRef idx="2">
+            <a:schemeClr val="accent6"/>
+          </a:fillRef>
+          <a:effectRef idx="1">
+            <a:schemeClr val="accent6"/>
+          </a:effectRef>
+          <a:fontRef idx="minor">
+            <a:schemeClr val="dk1"/>
+          </a:fontRef>
+        </p:style>
+        <p:txBody>
+          <a:bodyPr vert="vert270" rtlCol="0" anchor="ctr"/>
+          <a:lstStyle/>
+          <a:p>
+            <a:pPr algn="ctr"/>
+            <a:endParaRPr lang="es-CO" dirty="0"/>
+          </a:p>
+        </p:txBody>
+      </p:sp>
     </p:spTree>
     <p:extLst>
       <p:ext uri="{BB962C8B-B14F-4D97-AF65-F5344CB8AC3E}">
@@ -6838,6 +6970,50 @@
           </a:p>
         </p:txBody>
       </p:sp>
+      <p:sp>
+        <p:nvSpPr>
+          <p:cNvPr id="29" name="Flecha: hacia abajo 28">
+            <a:extLst>
+              <a:ext uri="{FF2B5EF4-FFF2-40B4-BE49-F238E27FC236}">
+                <a16:creationId xmlns:a16="http://schemas.microsoft.com/office/drawing/2014/main" id="{8A4BEA37-58C5-4BCB-A387-9D5A58D9C2DF}"/>
+              </a:ext>
+            </a:extLst>
+          </p:cNvPr>
+          <p:cNvSpPr/>
+          <p:nvPr/>
+        </p:nvSpPr>
+        <p:spPr>
+          <a:xfrm rot="5032494">
+            <a:off x="8979127" y="3363413"/>
+            <a:ext cx="398918" cy="2792041"/>
+          </a:xfrm>
+          <a:prstGeom prst="downArrow">
+            <a:avLst/>
+          </a:prstGeom>
+        </p:spPr>
+        <p:style>
+          <a:lnRef idx="1">
+            <a:schemeClr val="accent6"/>
+          </a:lnRef>
+          <a:fillRef idx="2">
+            <a:schemeClr val="accent6"/>
+          </a:fillRef>
+          <a:effectRef idx="1">
+            <a:schemeClr val="accent6"/>
+          </a:effectRef>
+          <a:fontRef idx="minor">
+            <a:schemeClr val="dk1"/>
+          </a:fontRef>
+        </p:style>
+        <p:txBody>
+          <a:bodyPr vert="vert270" rtlCol="0" anchor="ctr"/>
+          <a:lstStyle/>
+          <a:p>
+            <a:pPr algn="ctr"/>
+            <a:endParaRPr lang="es-CO" dirty="0"/>
+          </a:p>
+        </p:txBody>
+      </p:sp>
     </p:spTree>
     <p:extLst>
       <p:ext uri="{BB962C8B-B14F-4D97-AF65-F5344CB8AC3E}">
@@ -8152,6 +8328,50 @@
           </a:prstGeom>
         </p:spPr>
       </p:pic>
+      <p:sp>
+        <p:nvSpPr>
+          <p:cNvPr id="41" name="Flecha: hacia abajo 40">
+            <a:extLst>
+              <a:ext uri="{FF2B5EF4-FFF2-40B4-BE49-F238E27FC236}">
+                <a16:creationId xmlns:a16="http://schemas.microsoft.com/office/drawing/2014/main" id="{BC7C83B3-2D35-4B77-8A64-4642D490895F}"/>
+              </a:ext>
+            </a:extLst>
+          </p:cNvPr>
+          <p:cNvSpPr/>
+          <p:nvPr/>
+        </p:nvSpPr>
+        <p:spPr>
+          <a:xfrm rot="5032494">
+            <a:off x="8979127" y="3363413"/>
+            <a:ext cx="398918" cy="2792041"/>
+          </a:xfrm>
+          <a:prstGeom prst="downArrow">
+            <a:avLst/>
+          </a:prstGeom>
+        </p:spPr>
+        <p:style>
+          <a:lnRef idx="1">
+            <a:schemeClr val="accent6"/>
+          </a:lnRef>
+          <a:fillRef idx="2">
+            <a:schemeClr val="accent6"/>
+          </a:fillRef>
+          <a:effectRef idx="1">
+            <a:schemeClr val="accent6"/>
+          </a:effectRef>
+          <a:fontRef idx="minor">
+            <a:schemeClr val="dk1"/>
+          </a:fontRef>
+        </p:style>
+        <p:txBody>
+          <a:bodyPr vert="vert270" rtlCol="0" anchor="ctr"/>
+          <a:lstStyle/>
+          <a:p>
+            <a:pPr algn="ctr"/>
+            <a:endParaRPr lang="es-CO" dirty="0"/>
+          </a:p>
+        </p:txBody>
+      </p:sp>
     </p:spTree>
     <p:extLst>
       <p:ext uri="{BB962C8B-B14F-4D97-AF65-F5344CB8AC3E}">
@@ -9487,6 +9707,50 @@
           </a:prstGeom>
         </p:spPr>
       </p:pic>
+      <p:sp>
+        <p:nvSpPr>
+          <p:cNvPr id="30" name="Flecha: hacia abajo 29">
+            <a:extLst>
+              <a:ext uri="{FF2B5EF4-FFF2-40B4-BE49-F238E27FC236}">
+                <a16:creationId xmlns:a16="http://schemas.microsoft.com/office/drawing/2014/main" id="{693D8F4F-DF45-4E85-93A3-01CE1D0BF64A}"/>
+              </a:ext>
+            </a:extLst>
+          </p:cNvPr>
+          <p:cNvSpPr/>
+          <p:nvPr/>
+        </p:nvSpPr>
+        <p:spPr>
+          <a:xfrm rot="5032494">
+            <a:off x="8979127" y="3363413"/>
+            <a:ext cx="398918" cy="2792041"/>
+          </a:xfrm>
+          <a:prstGeom prst="downArrow">
+            <a:avLst/>
+          </a:prstGeom>
+        </p:spPr>
+        <p:style>
+          <a:lnRef idx="1">
+            <a:schemeClr val="accent6"/>
+          </a:lnRef>
+          <a:fillRef idx="2">
+            <a:schemeClr val="accent6"/>
+          </a:fillRef>
+          <a:effectRef idx="1">
+            <a:schemeClr val="accent6"/>
+          </a:effectRef>
+          <a:fontRef idx="minor">
+            <a:schemeClr val="dk1"/>
+          </a:fontRef>
+        </p:style>
+        <p:txBody>
+          <a:bodyPr vert="vert270" rtlCol="0" anchor="ctr"/>
+          <a:lstStyle/>
+          <a:p>
+            <a:pPr algn="ctr"/>
+            <a:endParaRPr lang="es-CO" dirty="0"/>
+          </a:p>
+        </p:txBody>
+      </p:sp>
     </p:spTree>
     <p:extLst>
       <p:ext uri="{BB962C8B-B14F-4D97-AF65-F5344CB8AC3E}">

</xml_diff>